<commit_message>
Added sorter pic to presentation and changed labels
Changed labels of trays
</commit_message>
<xml_diff>
--- a/Mid-term presentation/Second/DBL Embedded Systems.pptx
+++ b/Mid-term presentation/Second/DBL Embedded Systems.pptx
@@ -7824,8 +7824,38 @@
         <p:spPr>
           <a:xfrm>
             <a:off x="0" y="656975"/>
-            <a:ext cx="11392434" cy="5583404"/>
+            <a:ext cx="11392434" cy="5583403"/>
           </a:xfrm>
+        </p:spPr>
+      </p:pic>
+      <p:pic>
+        <p:nvPicPr>
+          <p:cNvPr id="3" name="Picture 2"/>
+          <p:cNvPicPr>
+            <a:picLocks noChangeAspect="1"/>
+          </p:cNvPicPr>
+          <p:nvPr/>
+        </p:nvPicPr>
+        <p:blipFill>
+          <a:blip r:embed="rId4">
+            <a:extLst>
+              <a:ext uri="{28A0092B-C50C-407E-A947-70E740481C1C}">
+                <a14:useLocalDpi xmlns:a14="http://schemas.microsoft.com/office/drawing/2010/main" val="0"/>
+              </a:ext>
+            </a:extLst>
+          </a:blip>
+          <a:stretch>
+            <a:fillRect/>
+          </a:stretch>
+        </p:blipFill>
+        <p:spPr>
+          <a:xfrm>
+            <a:off x="0" y="1130011"/>
+            <a:ext cx="8257264" cy="5833605"/>
+          </a:xfrm>
+          <a:prstGeom prst="rect">
+            <a:avLst/>
+          </a:prstGeom>
         </p:spPr>
       </p:pic>
     </p:spTree>
@@ -7844,7 +7874,228 @@
   <p:timing>
     <p:tnLst>
       <p:par>
-        <p:cTn id="1" dur="indefinite" restart="never" nodeType="tmRoot"/>
+        <p:cTn id="1" dur="indefinite" restart="never" nodeType="tmRoot">
+          <p:childTnLst>
+            <p:seq concurrent="1" nextAc="seek">
+              <p:cTn id="2" dur="indefinite" nodeType="mainSeq">
+                <p:childTnLst>
+                  <p:par>
+                    <p:cTn id="3" fill="hold">
+                      <p:stCondLst>
+                        <p:cond delay="indefinite"/>
+                      </p:stCondLst>
+                      <p:childTnLst>
+                        <p:par>
+                          <p:cTn id="4" fill="hold">
+                            <p:stCondLst>
+                              <p:cond delay="0"/>
+                            </p:stCondLst>
+                            <p:childTnLst>
+                              <p:par>
+                                <p:cTn id="5" presetID="53" presetClass="entr" presetSubtype="16" fill="hold" nodeType="clickEffect">
+                                  <p:stCondLst>
+                                    <p:cond delay="0"/>
+                                  </p:stCondLst>
+                                  <p:childTnLst>
+                                    <p:set>
+                                      <p:cBhvr>
+                                        <p:cTn id="6" dur="1" fill="hold">
+                                          <p:stCondLst>
+                                            <p:cond delay="0"/>
+                                          </p:stCondLst>
+                                        </p:cTn>
+                                        <p:tgtEl>
+                                          <p:spTgt spid="3"/>
+                                        </p:tgtEl>
+                                        <p:attrNameLst>
+                                          <p:attrName>style.visibility</p:attrName>
+                                        </p:attrNameLst>
+                                      </p:cBhvr>
+                                      <p:to>
+                                        <p:strVal val="visible"/>
+                                      </p:to>
+                                    </p:set>
+                                    <p:anim calcmode="lin" valueType="num">
+                                      <p:cBhvr>
+                                        <p:cTn id="7" dur="500" fill="hold"/>
+                                        <p:tgtEl>
+                                          <p:spTgt spid="3"/>
+                                        </p:tgtEl>
+                                        <p:attrNameLst>
+                                          <p:attrName>ppt_w</p:attrName>
+                                        </p:attrNameLst>
+                                      </p:cBhvr>
+                                      <p:tavLst>
+                                        <p:tav tm="0">
+                                          <p:val>
+                                            <p:fltVal val="0"/>
+                                          </p:val>
+                                        </p:tav>
+                                        <p:tav tm="100000">
+                                          <p:val>
+                                            <p:strVal val="#ppt_w"/>
+                                          </p:val>
+                                        </p:tav>
+                                      </p:tavLst>
+                                    </p:anim>
+                                    <p:anim calcmode="lin" valueType="num">
+                                      <p:cBhvr>
+                                        <p:cTn id="8" dur="500" fill="hold"/>
+                                        <p:tgtEl>
+                                          <p:spTgt spid="3"/>
+                                        </p:tgtEl>
+                                        <p:attrNameLst>
+                                          <p:attrName>ppt_h</p:attrName>
+                                        </p:attrNameLst>
+                                      </p:cBhvr>
+                                      <p:tavLst>
+                                        <p:tav tm="0">
+                                          <p:val>
+                                            <p:fltVal val="0"/>
+                                          </p:val>
+                                        </p:tav>
+                                        <p:tav tm="100000">
+                                          <p:val>
+                                            <p:strVal val="#ppt_h"/>
+                                          </p:val>
+                                        </p:tav>
+                                      </p:tavLst>
+                                    </p:anim>
+                                    <p:animEffect transition="in" filter="fade">
+                                      <p:cBhvr>
+                                        <p:cTn id="9" dur="500"/>
+                                        <p:tgtEl>
+                                          <p:spTgt spid="3"/>
+                                        </p:tgtEl>
+                                      </p:cBhvr>
+                                    </p:animEffect>
+                                  </p:childTnLst>
+                                </p:cTn>
+                              </p:par>
+                            </p:childTnLst>
+                          </p:cTn>
+                        </p:par>
+                      </p:childTnLst>
+                    </p:cTn>
+                  </p:par>
+                  <p:par>
+                    <p:cTn id="10" fill="hold">
+                      <p:stCondLst>
+                        <p:cond delay="indefinite"/>
+                      </p:stCondLst>
+                      <p:childTnLst>
+                        <p:par>
+                          <p:cTn id="11" fill="hold">
+                            <p:stCondLst>
+                              <p:cond delay="0"/>
+                            </p:stCondLst>
+                            <p:childTnLst>
+                              <p:par>
+                                <p:cTn id="12" presetID="53" presetClass="exit" presetSubtype="32" fill="hold" nodeType="clickEffect">
+                                  <p:stCondLst>
+                                    <p:cond delay="0"/>
+                                  </p:stCondLst>
+                                  <p:childTnLst>
+                                    <p:anim calcmode="lin" valueType="num">
+                                      <p:cBhvr>
+                                        <p:cTn id="13" dur="500"/>
+                                        <p:tgtEl>
+                                          <p:spTgt spid="3"/>
+                                        </p:tgtEl>
+                                        <p:attrNameLst>
+                                          <p:attrName>ppt_w</p:attrName>
+                                        </p:attrNameLst>
+                                      </p:cBhvr>
+                                      <p:tavLst>
+                                        <p:tav tm="0">
+                                          <p:val>
+                                            <p:strVal val="ppt_w"/>
+                                          </p:val>
+                                        </p:tav>
+                                        <p:tav tm="100000">
+                                          <p:val>
+                                            <p:fltVal val="0"/>
+                                          </p:val>
+                                        </p:tav>
+                                      </p:tavLst>
+                                    </p:anim>
+                                    <p:anim calcmode="lin" valueType="num">
+                                      <p:cBhvr>
+                                        <p:cTn id="14" dur="500"/>
+                                        <p:tgtEl>
+                                          <p:spTgt spid="3"/>
+                                        </p:tgtEl>
+                                        <p:attrNameLst>
+                                          <p:attrName>ppt_h</p:attrName>
+                                        </p:attrNameLst>
+                                      </p:cBhvr>
+                                      <p:tavLst>
+                                        <p:tav tm="0">
+                                          <p:val>
+                                            <p:strVal val="ppt_h"/>
+                                          </p:val>
+                                        </p:tav>
+                                        <p:tav tm="100000">
+                                          <p:val>
+                                            <p:fltVal val="0"/>
+                                          </p:val>
+                                        </p:tav>
+                                      </p:tavLst>
+                                    </p:anim>
+                                    <p:animEffect transition="out" filter="fade">
+                                      <p:cBhvr>
+                                        <p:cTn id="15" dur="500"/>
+                                        <p:tgtEl>
+                                          <p:spTgt spid="3"/>
+                                        </p:tgtEl>
+                                      </p:cBhvr>
+                                    </p:animEffect>
+                                    <p:set>
+                                      <p:cBhvr>
+                                        <p:cTn id="16" dur="1" fill="hold">
+                                          <p:stCondLst>
+                                            <p:cond delay="499"/>
+                                          </p:stCondLst>
+                                        </p:cTn>
+                                        <p:tgtEl>
+                                          <p:spTgt spid="3"/>
+                                        </p:tgtEl>
+                                        <p:attrNameLst>
+                                          <p:attrName>style.visibility</p:attrName>
+                                        </p:attrNameLst>
+                                      </p:cBhvr>
+                                      <p:to>
+                                        <p:strVal val="hidden"/>
+                                      </p:to>
+                                    </p:set>
+                                  </p:childTnLst>
+                                </p:cTn>
+                              </p:par>
+                            </p:childTnLst>
+                          </p:cTn>
+                        </p:par>
+                      </p:childTnLst>
+                    </p:cTn>
+                  </p:par>
+                </p:childTnLst>
+              </p:cTn>
+              <p:prevCondLst>
+                <p:cond evt="onPrev" delay="0">
+                  <p:tgtEl>
+                    <p:sldTgt/>
+                  </p:tgtEl>
+                </p:cond>
+              </p:prevCondLst>
+              <p:nextCondLst>
+                <p:cond evt="onNext" delay="0">
+                  <p:tgtEl>
+                    <p:sldTgt/>
+                  </p:tgtEl>
+                </p:cond>
+              </p:nextCondLst>
+            </p:seq>
+          </p:childTnLst>
+        </p:cTn>
       </p:par>
     </p:tnLst>
   </p:timing>

</xml_diff>

<commit_message>
FIxed the images animation on the presentation
</commit_message>
<xml_diff>
--- a/Mid-term presentation/Second/DBL Embedded Systems.pptx
+++ b/Mid-term presentation/Second/DBL Embedded Systems.pptx
@@ -202,7 +202,7 @@
           <a:p>
             <a:fld id="{6ACF7646-F517-410B-A50A-CA20C9403921}" type="datetimeFigureOut">
               <a:rPr lang="en-GB" smtClean="0"/>
-              <a:t>20/03/2015</a:t>
+              <a:t>24/03/2015</a:t>
             </a:fld>
             <a:endParaRPr lang="en-GB"/>
           </a:p>
@@ -1122,7 +1122,7 @@
             <a:fld id="{B61BEF0D-F0BB-DE4B-95CE-6DB70DBA9567}" type="datetimeFigureOut">
               <a:rPr lang="en-US" smtClean="0"/>
               <a:pPr/>
-              <a:t>3/20/2015</a:t>
+              <a:t>3/24/2015</a:t>
             </a:fld>
             <a:endParaRPr lang="en-US" dirty="0"/>
           </a:p>
@@ -1399,7 +1399,7 @@
             <a:fld id="{B61BEF0D-F0BB-DE4B-95CE-6DB70DBA9567}" type="datetimeFigureOut">
               <a:rPr lang="en-US" smtClean="0"/>
               <a:pPr/>
-              <a:t>3/20/2015</a:t>
+              <a:t>3/24/2015</a:t>
             </a:fld>
             <a:endParaRPr lang="en-US" dirty="0"/>
           </a:p>
@@ -1595,7 +1595,7 @@
             <a:fld id="{B61BEF0D-F0BB-DE4B-95CE-6DB70DBA9567}" type="datetimeFigureOut">
               <a:rPr lang="en-US" smtClean="0"/>
               <a:pPr/>
-              <a:t>3/20/2015</a:t>
+              <a:t>3/24/2015</a:t>
             </a:fld>
             <a:endParaRPr lang="en-US" dirty="0"/>
           </a:p>
@@ -1870,7 +1870,7 @@
             <a:fld id="{B61BEF0D-F0BB-DE4B-95CE-6DB70DBA9567}" type="datetimeFigureOut">
               <a:rPr lang="en-US" smtClean="0"/>
               <a:pPr/>
-              <a:t>3/20/2015</a:t>
+              <a:t>3/24/2015</a:t>
             </a:fld>
             <a:endParaRPr lang="en-US" dirty="0"/>
           </a:p>
@@ -2213,7 +2213,7 @@
             <a:fld id="{B61BEF0D-F0BB-DE4B-95CE-6DB70DBA9567}" type="datetimeFigureOut">
               <a:rPr lang="en-US" smtClean="0"/>
               <a:pPr/>
-              <a:t>3/20/2015</a:t>
+              <a:t>3/24/2015</a:t>
             </a:fld>
             <a:endParaRPr lang="en-US" dirty="0"/>
           </a:p>
@@ -2838,7 +2838,7 @@
             <a:fld id="{B61BEF0D-F0BB-DE4B-95CE-6DB70DBA9567}" type="datetimeFigureOut">
               <a:rPr lang="en-US" smtClean="0"/>
               <a:pPr/>
-              <a:t>3/20/2015</a:t>
+              <a:t>3/24/2015</a:t>
             </a:fld>
             <a:endParaRPr lang="en-US" dirty="0"/>
           </a:p>
@@ -3700,7 +3700,7 @@
             <a:fld id="{B61BEF0D-F0BB-DE4B-95CE-6DB70DBA9567}" type="datetimeFigureOut">
               <a:rPr lang="en-US" smtClean="0"/>
               <a:pPr/>
-              <a:t>3/20/2015</a:t>
+              <a:t>3/24/2015</a:t>
             </a:fld>
             <a:endParaRPr lang="en-US" dirty="0"/>
           </a:p>
@@ -3872,7 +3872,7 @@
             <a:fld id="{B61BEF0D-F0BB-DE4B-95CE-6DB70DBA9567}" type="datetimeFigureOut">
               <a:rPr lang="en-US" smtClean="0"/>
               <a:pPr/>
-              <a:t>3/20/2015</a:t>
+              <a:t>3/24/2015</a:t>
             </a:fld>
             <a:endParaRPr lang="en-US" dirty="0"/>
           </a:p>
@@ -4054,7 +4054,7 @@
             <a:fld id="{B61BEF0D-F0BB-DE4B-95CE-6DB70DBA9567}" type="datetimeFigureOut">
               <a:rPr lang="en-US" smtClean="0"/>
               <a:pPr/>
-              <a:t>3/20/2015</a:t>
+              <a:t>3/24/2015</a:t>
             </a:fld>
             <a:endParaRPr lang="en-US" dirty="0"/>
           </a:p>
@@ -4226,7 +4226,7 @@
             <a:fld id="{B61BEF0D-F0BB-DE4B-95CE-6DB70DBA9567}" type="datetimeFigureOut">
               <a:rPr lang="en-US" smtClean="0"/>
               <a:pPr/>
-              <a:t>3/20/2015</a:t>
+              <a:t>3/24/2015</a:t>
             </a:fld>
             <a:endParaRPr lang="en-US" dirty="0"/>
           </a:p>
@@ -4475,7 +4475,7 @@
             <a:fld id="{B61BEF0D-F0BB-DE4B-95CE-6DB70DBA9567}" type="datetimeFigureOut">
               <a:rPr lang="en-US" smtClean="0"/>
               <a:pPr/>
-              <a:t>3/20/2015</a:t>
+              <a:t>3/24/2015</a:t>
             </a:fld>
             <a:endParaRPr lang="en-US" dirty="0"/>
           </a:p>
@@ -4769,7 +4769,7 @@
             <a:fld id="{B61BEF0D-F0BB-DE4B-95CE-6DB70DBA9567}" type="datetimeFigureOut">
               <a:rPr lang="en-US" smtClean="0"/>
               <a:pPr/>
-              <a:t>3/20/2015</a:t>
+              <a:t>3/24/2015</a:t>
             </a:fld>
             <a:endParaRPr lang="en-US" dirty="0"/>
           </a:p>
@@ -5215,7 +5215,7 @@
             <a:fld id="{B61BEF0D-F0BB-DE4B-95CE-6DB70DBA9567}" type="datetimeFigureOut">
               <a:rPr lang="en-US" smtClean="0"/>
               <a:pPr/>
-              <a:t>3/20/2015</a:t>
+              <a:t>3/24/2015</a:t>
             </a:fld>
             <a:endParaRPr lang="en-US" dirty="0"/>
           </a:p>
@@ -5335,7 +5335,7 @@
             <a:fld id="{B61BEF0D-F0BB-DE4B-95CE-6DB70DBA9567}" type="datetimeFigureOut">
               <a:rPr lang="en-US" smtClean="0"/>
               <a:pPr/>
-              <a:t>3/20/2015</a:t>
+              <a:t>3/24/2015</a:t>
             </a:fld>
             <a:endParaRPr lang="en-US" dirty="0"/>
           </a:p>
@@ -5432,7 +5432,7 @@
             <a:fld id="{B61BEF0D-F0BB-DE4B-95CE-6DB70DBA9567}" type="datetimeFigureOut">
               <a:rPr lang="en-US" smtClean="0"/>
               <a:pPr/>
-              <a:t>3/20/2015</a:t>
+              <a:t>3/24/2015</a:t>
             </a:fld>
             <a:endParaRPr lang="en-US" dirty="0"/>
           </a:p>
@@ -5713,7 +5713,7 @@
             <a:fld id="{B61BEF0D-F0BB-DE4B-95CE-6DB70DBA9567}" type="datetimeFigureOut">
               <a:rPr lang="en-US" smtClean="0"/>
               <a:pPr/>
-              <a:t>3/20/2015</a:t>
+              <a:t>3/24/2015</a:t>
             </a:fld>
             <a:endParaRPr lang="en-US" dirty="0"/>
           </a:p>
@@ -5990,7 +5990,7 @@
             <a:fld id="{B61BEF0D-F0BB-DE4B-95CE-6DB70DBA9567}" type="datetimeFigureOut">
               <a:rPr lang="en-US" smtClean="0"/>
               <a:pPr/>
-              <a:t>3/20/2015</a:t>
+              <a:t>3/24/2015</a:t>
             </a:fld>
             <a:endParaRPr lang="en-US" dirty="0"/>
           </a:p>
@@ -6421,7 +6421,7 @@
             <a:fld id="{B61BEF0D-F0BB-DE4B-95CE-6DB70DBA9567}" type="datetimeFigureOut">
               <a:rPr lang="en-US" smtClean="0"/>
               <a:pPr/>
-              <a:t>3/20/2015</a:t>
+              <a:t>3/24/2015</a:t>
             </a:fld>
             <a:endParaRPr lang="en-US" dirty="0"/>
           </a:p>
@@ -7850,7 +7850,7 @@
         </p:blipFill>
         <p:spPr>
           <a:xfrm>
-            <a:off x="0" y="1130011"/>
+            <a:off x="1567585" y="910095"/>
             <a:ext cx="8257264" cy="5833605"/>
           </a:xfrm>
           <a:prstGeom prst="rect">
@@ -7883,6 +7883,9 @@
                     <p:cTn id="3" fill="hold">
                       <p:stCondLst>
                         <p:cond delay="indefinite"/>
+                        <p:cond evt="onBegin" delay="0">
+                          <p:tn val="2"/>
+                        </p:cond>
                       </p:stCondLst>
                       <p:childTnLst>
                         <p:par>
@@ -7892,7 +7895,7 @@
                             </p:stCondLst>
                             <p:childTnLst>
                               <p:par>
-                                <p:cTn id="5" presetID="53" presetClass="entr" presetSubtype="16" fill="hold" nodeType="clickEffect">
+                                <p:cTn id="5" presetID="1" presetClass="entr" presetSubtype="0" fill="hold" nodeType="withEffect">
                                   <p:stCondLst>
                                     <p:cond delay="0"/>
                                   </p:stCondLst>
@@ -7900,6 +7903,95 @@
                                     <p:set>
                                       <p:cBhvr>
                                         <p:cTn id="6" dur="1" fill="hold">
+                                          <p:stCondLst>
+                                            <p:cond delay="0"/>
+                                          </p:stCondLst>
+                                        </p:cTn>
+                                        <p:tgtEl>
+                                          <p:spTgt spid="4"/>
+                                        </p:tgtEl>
+                                        <p:attrNameLst>
+                                          <p:attrName>style.visibility</p:attrName>
+                                        </p:attrNameLst>
+                                      </p:cBhvr>
+                                      <p:to>
+                                        <p:strVal val="visible"/>
+                                      </p:to>
+                                    </p:set>
+                                  </p:childTnLst>
+                                </p:cTn>
+                              </p:par>
+                            </p:childTnLst>
+                          </p:cTn>
+                        </p:par>
+                      </p:childTnLst>
+                    </p:cTn>
+                  </p:par>
+                  <p:par>
+                    <p:cTn id="7" fill="hold">
+                      <p:stCondLst>
+                        <p:cond delay="indefinite"/>
+                      </p:stCondLst>
+                      <p:childTnLst>
+                        <p:par>
+                          <p:cTn id="8" fill="hold">
+                            <p:stCondLst>
+                              <p:cond delay="0"/>
+                            </p:stCondLst>
+                            <p:childTnLst>
+                              <p:par>
+                                <p:cTn id="9" presetID="10" presetClass="exit" presetSubtype="0" fill="hold" nodeType="clickEffect">
+                                  <p:stCondLst>
+                                    <p:cond delay="0"/>
+                                  </p:stCondLst>
+                                  <p:childTnLst>
+                                    <p:animEffect transition="out" filter="fade">
+                                      <p:cBhvr>
+                                        <p:cTn id="10" dur="500"/>
+                                        <p:tgtEl>
+                                          <p:spTgt spid="4"/>
+                                        </p:tgtEl>
+                                      </p:cBhvr>
+                                    </p:animEffect>
+                                    <p:set>
+                                      <p:cBhvr>
+                                        <p:cTn id="11" dur="1" fill="hold">
+                                          <p:stCondLst>
+                                            <p:cond delay="499"/>
+                                          </p:stCondLst>
+                                        </p:cTn>
+                                        <p:tgtEl>
+                                          <p:spTgt spid="4"/>
+                                        </p:tgtEl>
+                                        <p:attrNameLst>
+                                          <p:attrName>style.visibility</p:attrName>
+                                        </p:attrNameLst>
+                                      </p:cBhvr>
+                                      <p:to>
+                                        <p:strVal val="hidden"/>
+                                      </p:to>
+                                    </p:set>
+                                  </p:childTnLst>
+                                </p:cTn>
+                              </p:par>
+                            </p:childTnLst>
+                          </p:cTn>
+                        </p:par>
+                        <p:par>
+                          <p:cTn id="12" fill="hold">
+                            <p:stCondLst>
+                              <p:cond delay="500"/>
+                            </p:stCondLst>
+                            <p:childTnLst>
+                              <p:par>
+                                <p:cTn id="13" presetID="53" presetClass="entr" presetSubtype="16" fill="hold" nodeType="afterEffect">
+                                  <p:stCondLst>
+                                    <p:cond delay="0"/>
+                                  </p:stCondLst>
+                                  <p:childTnLst>
+                                    <p:set>
+                                      <p:cBhvr>
+                                        <p:cTn id="14" dur="1" fill="hold">
                                           <p:stCondLst>
                                             <p:cond delay="0"/>
                                           </p:stCondLst>
@@ -7917,7 +8009,7 @@
                                     </p:set>
                                     <p:anim calcmode="lin" valueType="num">
                                       <p:cBhvr>
-                                        <p:cTn id="7" dur="500" fill="hold"/>
+                                        <p:cTn id="15" dur="500" fill="hold"/>
                                         <p:tgtEl>
                                           <p:spTgt spid="3"/>
                                         </p:tgtEl>
@@ -7940,7 +8032,7 @@
                                     </p:anim>
                                     <p:anim calcmode="lin" valueType="num">
                                       <p:cBhvr>
-                                        <p:cTn id="8" dur="500" fill="hold"/>
+                                        <p:cTn id="16" dur="500" fill="hold"/>
                                         <p:tgtEl>
                                           <p:spTgt spid="3"/>
                                         </p:tgtEl>
@@ -7963,111 +8055,12 @@
                                     </p:anim>
                                     <p:animEffect transition="in" filter="fade">
                                       <p:cBhvr>
-                                        <p:cTn id="9" dur="500"/>
+                                        <p:cTn id="17" dur="500"/>
                                         <p:tgtEl>
                                           <p:spTgt spid="3"/>
                                         </p:tgtEl>
                                       </p:cBhvr>
                                     </p:animEffect>
-                                  </p:childTnLst>
-                                </p:cTn>
-                              </p:par>
-                            </p:childTnLst>
-                          </p:cTn>
-                        </p:par>
-                      </p:childTnLst>
-                    </p:cTn>
-                  </p:par>
-                  <p:par>
-                    <p:cTn id="10" fill="hold">
-                      <p:stCondLst>
-                        <p:cond delay="indefinite"/>
-                      </p:stCondLst>
-                      <p:childTnLst>
-                        <p:par>
-                          <p:cTn id="11" fill="hold">
-                            <p:stCondLst>
-                              <p:cond delay="0"/>
-                            </p:stCondLst>
-                            <p:childTnLst>
-                              <p:par>
-                                <p:cTn id="12" presetID="53" presetClass="exit" presetSubtype="32" fill="hold" nodeType="clickEffect">
-                                  <p:stCondLst>
-                                    <p:cond delay="0"/>
-                                  </p:stCondLst>
-                                  <p:childTnLst>
-                                    <p:anim calcmode="lin" valueType="num">
-                                      <p:cBhvr>
-                                        <p:cTn id="13" dur="500"/>
-                                        <p:tgtEl>
-                                          <p:spTgt spid="3"/>
-                                        </p:tgtEl>
-                                        <p:attrNameLst>
-                                          <p:attrName>ppt_w</p:attrName>
-                                        </p:attrNameLst>
-                                      </p:cBhvr>
-                                      <p:tavLst>
-                                        <p:tav tm="0">
-                                          <p:val>
-                                            <p:strVal val="ppt_w"/>
-                                          </p:val>
-                                        </p:tav>
-                                        <p:tav tm="100000">
-                                          <p:val>
-                                            <p:fltVal val="0"/>
-                                          </p:val>
-                                        </p:tav>
-                                      </p:tavLst>
-                                    </p:anim>
-                                    <p:anim calcmode="lin" valueType="num">
-                                      <p:cBhvr>
-                                        <p:cTn id="14" dur="500"/>
-                                        <p:tgtEl>
-                                          <p:spTgt spid="3"/>
-                                        </p:tgtEl>
-                                        <p:attrNameLst>
-                                          <p:attrName>ppt_h</p:attrName>
-                                        </p:attrNameLst>
-                                      </p:cBhvr>
-                                      <p:tavLst>
-                                        <p:tav tm="0">
-                                          <p:val>
-                                            <p:strVal val="ppt_h"/>
-                                          </p:val>
-                                        </p:tav>
-                                        <p:tav tm="100000">
-                                          <p:val>
-                                            <p:fltVal val="0"/>
-                                          </p:val>
-                                        </p:tav>
-                                      </p:tavLst>
-                                    </p:anim>
-                                    <p:animEffect transition="out" filter="fade">
-                                      <p:cBhvr>
-                                        <p:cTn id="15" dur="500"/>
-                                        <p:tgtEl>
-                                          <p:spTgt spid="3"/>
-                                        </p:tgtEl>
-                                      </p:cBhvr>
-                                    </p:animEffect>
-                                    <p:set>
-                                      <p:cBhvr>
-                                        <p:cTn id="16" dur="1" fill="hold">
-                                          <p:stCondLst>
-                                            <p:cond delay="499"/>
-                                          </p:stCondLst>
-                                        </p:cTn>
-                                        <p:tgtEl>
-                                          <p:spTgt spid="3"/>
-                                        </p:tgtEl>
-                                        <p:attrNameLst>
-                                          <p:attrName>style.visibility</p:attrName>
-                                        </p:attrNameLst>
-                                      </p:cBhvr>
-                                      <p:to>
-                                        <p:strVal val="hidden"/>
-                                      </p:to>
-                                    </p:set>
                                   </p:childTnLst>
                                 </p:cTn>
                               </p:par>

</xml_diff>

<commit_message>
Added zoom in to overall sketch
To highlight the machine as consisting out of different parts
</commit_message>
<xml_diff>
--- a/Mid-term presentation/Second/DBL Embedded Systems.pptx
+++ b/Mid-term presentation/Second/DBL Embedded Systems.pptx
@@ -7883,9 +7883,6 @@
                     <p:cTn id="3" fill="hold">
                       <p:stCondLst>
                         <p:cond delay="indefinite"/>
-                        <p:cond evt="onBegin" delay="0">
-                          <p:tn val="2"/>
-                        </p:cond>
                       </p:stCondLst>
                       <p:childTnLst>
                         <p:par>
@@ -7895,29 +7892,42 @@
                             </p:stCondLst>
                             <p:childTnLst>
                               <p:par>
-                                <p:cTn id="5" presetID="1" presetClass="entr" presetSubtype="0" fill="hold" nodeType="withEffect">
+                                <p:cTn id="5" presetID="35" presetClass="path" presetSubtype="0" fill="hold" nodeType="clickEffect">
                                   <p:stCondLst>
                                     <p:cond delay="0"/>
                                   </p:stCondLst>
                                   <p:childTnLst>
-                                    <p:set>
+                                    <p:animMotion origin="layout" path="M 2.5E-6 2.22222E-6 L -0.38047 -0.0007 " pathEditMode="relative" rAng="0" ptsTypes="AA">
                                       <p:cBhvr>
-                                        <p:cTn id="6" dur="1" fill="hold">
-                                          <p:stCondLst>
-                                            <p:cond delay="0"/>
-                                          </p:stCondLst>
-                                        </p:cTn>
+                                        <p:cTn id="6" dur="2000" fill="hold"/>
                                         <p:tgtEl>
                                           <p:spTgt spid="4"/>
                                         </p:tgtEl>
                                         <p:attrNameLst>
-                                          <p:attrName>style.visibility</p:attrName>
+                                          <p:attrName>ppt_x</p:attrName>
+                                          <p:attrName>ppt_y</p:attrName>
                                         </p:attrNameLst>
                                       </p:cBhvr>
-                                      <p:to>
-                                        <p:strVal val="visible"/>
-                                      </p:to>
-                                    </p:set>
+                                      <p:rCtr x="-19023" y="-46"/>
+                                    </p:animMotion>
+                                  </p:childTnLst>
+                                </p:cTn>
+                              </p:par>
+                              <p:par>
+                                <p:cTn id="7" presetID="6" presetClass="emph" presetSubtype="0" fill="hold" nodeType="withEffect">
+                                  <p:stCondLst>
+                                    <p:cond delay="0"/>
+                                  </p:stCondLst>
+                                  <p:childTnLst>
+                                    <p:animScale>
+                                      <p:cBhvr>
+                                        <p:cTn id="8" dur="2000" fill="hold"/>
+                                        <p:tgtEl>
+                                          <p:spTgt spid="4"/>
+                                        </p:tgtEl>
+                                      </p:cBhvr>
+                                      <p:by x="150000" y="150000"/>
+                                    </p:animScale>
                                   </p:childTnLst>
                                 </p:cTn>
                               </p:par>
@@ -7928,26 +7938,124 @@
                     </p:cTn>
                   </p:par>
                   <p:par>
-                    <p:cTn id="7" fill="hold">
+                    <p:cTn id="9" fill="hold">
                       <p:stCondLst>
                         <p:cond delay="indefinite"/>
                       </p:stCondLst>
                       <p:childTnLst>
                         <p:par>
-                          <p:cTn id="8" fill="hold">
+                          <p:cTn id="10" fill="hold">
                             <p:stCondLst>
                               <p:cond delay="0"/>
                             </p:stCondLst>
                             <p:childTnLst>
                               <p:par>
-                                <p:cTn id="9" presetID="10" presetClass="exit" presetSubtype="0" fill="hold" nodeType="clickEffect">
+                                <p:cTn id="11" presetID="42" presetClass="path" presetSubtype="0" fill="hold" nodeType="clickEffect">
+                                  <p:stCondLst>
+                                    <p:cond delay="0"/>
+                                  </p:stCondLst>
+                                  <p:childTnLst>
+                                    <p:animMotion origin="layout" path="M -0.38047 -0.0007 L -0.11211 0.1868 " pathEditMode="relative" rAng="0" ptsTypes="AA">
+                                      <p:cBhvr>
+                                        <p:cTn id="12" dur="2000" fill="hold"/>
+                                        <p:tgtEl>
+                                          <p:spTgt spid="4"/>
+                                        </p:tgtEl>
+                                        <p:attrNameLst>
+                                          <p:attrName>ppt_x</p:attrName>
+                                          <p:attrName>ppt_y</p:attrName>
+                                        </p:attrNameLst>
+                                      </p:cBhvr>
+                                      <p:rCtr x="13411" y="9375"/>
+                                    </p:animMotion>
+                                  </p:childTnLst>
+                                </p:cTn>
+                              </p:par>
+                              <p:par>
+                                <p:cTn id="13" presetID="6" presetClass="emph" presetSubtype="0" fill="hold" nodeType="withEffect">
+                                  <p:stCondLst>
+                                    <p:cond delay="0"/>
+                                  </p:stCondLst>
+                                  <p:childTnLst>
+                                    <p:animScale>
+                                      <p:cBhvr>
+                                        <p:cTn id="14" dur="2000" fill="hold"/>
+                                        <p:tgtEl>
+                                          <p:spTgt spid="4"/>
+                                        </p:tgtEl>
+                                      </p:cBhvr>
+                                      <p:by x="120000" y="120000"/>
+                                    </p:animScale>
+                                  </p:childTnLst>
+                                </p:cTn>
+                              </p:par>
+                            </p:childTnLst>
+                          </p:cTn>
+                        </p:par>
+                      </p:childTnLst>
+                    </p:cTn>
+                  </p:par>
+                  <p:par>
+                    <p:cTn id="15" fill="hold">
+                      <p:stCondLst>
+                        <p:cond delay="indefinite"/>
+                      </p:stCondLst>
+                      <p:childTnLst>
+                        <p:par>
+                          <p:cTn id="16" fill="hold">
+                            <p:stCondLst>
+                              <p:cond delay="0"/>
+                            </p:stCondLst>
+                            <p:childTnLst>
+                              <p:par>
+                                <p:cTn id="17" presetID="42" presetClass="path" presetSubtype="0" accel="50000" decel="50000" fill="hold" nodeType="clickEffect">
+                                  <p:stCondLst>
+                                    <p:cond delay="0"/>
+                                  </p:stCondLst>
+                                  <p:childTnLst>
+                                    <p:animMotion origin="layout" path="M -0.11211 0.1868 L 0.28984 0.08889 " pathEditMode="relative" rAng="0" ptsTypes="AA">
+                                      <p:cBhvr>
+                                        <p:cTn id="18" dur="2000" fill="hold"/>
+                                        <p:tgtEl>
+                                          <p:spTgt spid="4"/>
+                                        </p:tgtEl>
+                                        <p:attrNameLst>
+                                          <p:attrName>ppt_x</p:attrName>
+                                          <p:attrName>ppt_y</p:attrName>
+                                        </p:attrNameLst>
+                                      </p:cBhvr>
+                                      <p:rCtr x="20091" y="-4907"/>
+                                    </p:animMotion>
+                                  </p:childTnLst>
+                                </p:cTn>
+                              </p:par>
+                            </p:childTnLst>
+                          </p:cTn>
+                        </p:par>
+                      </p:childTnLst>
+                    </p:cTn>
+                  </p:par>
+                  <p:par>
+                    <p:cTn id="19" fill="hold">
+                      <p:stCondLst>
+                        <p:cond delay="indefinite"/>
+                      </p:stCondLst>
+                      <p:childTnLst>
+                        <p:par>
+                          <p:cTn id="20" fill="hold">
+                            <p:stCondLst>
+                              <p:cond delay="0"/>
+                            </p:stCondLst>
+                            <p:childTnLst>
+                              <p:par>
+                                <p:cTn id="21" presetID="10" presetClass="exit" presetSubtype="0" fill="hold" nodeType="clickEffect">
                                   <p:stCondLst>
                                     <p:cond delay="0"/>
                                   </p:stCondLst>
                                   <p:childTnLst>
                                     <p:animEffect transition="out" filter="fade">
                                       <p:cBhvr>
-                                        <p:cTn id="10" dur="500"/>
+                                        <p:cTn id="22" dur="500"/>
                                         <p:tgtEl>
                                           <p:spTgt spid="4"/>
                                         </p:tgtEl>
@@ -7955,7 +8063,7 @@
                                     </p:animEffect>
                                     <p:set>
                                       <p:cBhvr>
-                                        <p:cTn id="11" dur="1" fill="hold">
+                                        <p:cTn id="23" dur="1" fill="hold">
                                           <p:stCondLst>
                                             <p:cond delay="499"/>
                                           </p:stCondLst>
@@ -7978,20 +8086,20 @@
                           </p:cTn>
                         </p:par>
                         <p:par>
-                          <p:cTn id="12" fill="hold">
+                          <p:cTn id="24" fill="hold">
                             <p:stCondLst>
                               <p:cond delay="500"/>
                             </p:stCondLst>
                             <p:childTnLst>
                               <p:par>
-                                <p:cTn id="13" presetID="53" presetClass="entr" presetSubtype="16" fill="hold" nodeType="afterEffect">
+                                <p:cTn id="25" presetID="53" presetClass="entr" presetSubtype="16" fill="hold" nodeType="afterEffect">
                                   <p:stCondLst>
                                     <p:cond delay="0"/>
                                   </p:stCondLst>
                                   <p:childTnLst>
                                     <p:set>
                                       <p:cBhvr>
-                                        <p:cTn id="14" dur="1" fill="hold">
+                                        <p:cTn id="26" dur="1" fill="hold">
                                           <p:stCondLst>
                                             <p:cond delay="0"/>
                                           </p:stCondLst>
@@ -8009,7 +8117,7 @@
                                     </p:set>
                                     <p:anim calcmode="lin" valueType="num">
                                       <p:cBhvr>
-                                        <p:cTn id="15" dur="500" fill="hold"/>
+                                        <p:cTn id="27" dur="500" fill="hold"/>
                                         <p:tgtEl>
                                           <p:spTgt spid="3"/>
                                         </p:tgtEl>
@@ -8032,7 +8140,7 @@
                                     </p:anim>
                                     <p:anim calcmode="lin" valueType="num">
                                       <p:cBhvr>
-                                        <p:cTn id="16" dur="500" fill="hold"/>
+                                        <p:cTn id="28" dur="500" fill="hold"/>
                                         <p:tgtEl>
                                           <p:spTgt spid="3"/>
                                         </p:tgtEl>
@@ -8055,7 +8163,7 @@
                                     </p:anim>
                                     <p:animEffect transition="in" filter="fade">
                                       <p:cBhvr>
-                                        <p:cTn id="17" dur="500"/>
+                                        <p:cTn id="29" dur="500"/>
                                         <p:tgtEl>
                                           <p:spTgt spid="3"/>
                                         </p:tgtEl>

</xml_diff>

<commit_message>
Added keywords to PPP and made minor changes to my part
Changes to my part:
- removed keywords
- added reason to position position sensor the way it is positioned
</commit_message>
<xml_diff>
--- a/Mid-term presentation/Second/DBL Embedded Systems.pptx
+++ b/Mid-term presentation/Second/DBL Embedded Systems.pptx
@@ -202,7 +202,7 @@
           <a:p>
             <a:fld id="{6ACF7646-F517-410B-A50A-CA20C9403921}" type="datetimeFigureOut">
               <a:rPr lang="en-GB" smtClean="0"/>
-              <a:t>25/03/2015</a:t>
+              <a:t>26/03/2015</a:t>
             </a:fld>
             <a:endParaRPr lang="en-GB"/>
           </a:p>
@@ -717,6 +717,64 @@
           <a:bodyPr/>
           <a:lstStyle/>
           <a:p>
+            <a:r>
+              <a:rPr lang="en-US" dirty="0" smtClean="0"/>
+              <a:t>tube: </a:t>
+            </a:r>
+          </a:p>
+          <a:p>
+            <a:r>
+              <a:rPr lang="en-US" dirty="0" smtClean="0"/>
+              <a:t>	reliable</a:t>
+            </a:r>
+          </a:p>
+          <a:p>
+            <a:r>
+              <a:rPr lang="en-US" dirty="0" smtClean="0"/>
+              <a:t>	easily fall</a:t>
+            </a:r>
+          </a:p>
+          <a:p>
+            <a:r>
+              <a:rPr lang="en-US" dirty="0" smtClean="0"/>
+              <a:t>	fast</a:t>
+            </a:r>
+          </a:p>
+          <a:p>
+            <a:r>
+              <a:rPr lang="en-US" dirty="0" smtClean="0"/>
+              <a:t>Time between discs</a:t>
+            </a:r>
+          </a:p>
+          <a:p>
+            <a:r>
+              <a:rPr lang="en-US" dirty="0" smtClean="0"/>
+              <a:t>cam</a:t>
+            </a:r>
+          </a:p>
+          <a:p>
+            <a:r>
+              <a:rPr lang="en-US" dirty="0" smtClean="0"/>
+              <a:t>tilt</a:t>
+            </a:r>
+          </a:p>
+          <a:p>
+            <a:r>
+              <a:rPr lang="en-US" dirty="0" smtClean="0"/>
+              <a:t>sorter</a:t>
+            </a:r>
+          </a:p>
+          <a:p>
+            <a:r>
+              <a:rPr lang="en-US" dirty="0" smtClean="0"/>
+              <a:t>floor space</a:t>
+            </a:r>
+          </a:p>
+          <a:p>
+            <a:r>
+              <a:rPr lang="en-US" dirty="0" smtClean="0"/>
+              <a:t>faster</a:t>
+            </a:r>
             <a:endParaRPr lang="en-GB" dirty="0"/>
           </a:p>
         </p:txBody>
@@ -1122,7 +1180,7 @@
             <a:fld id="{B61BEF0D-F0BB-DE4B-95CE-6DB70DBA9567}" type="datetimeFigureOut">
               <a:rPr lang="en-US" smtClean="0"/>
               <a:pPr/>
-              <a:t>3/25/2015</a:t>
+              <a:t>3/26/2015</a:t>
             </a:fld>
             <a:endParaRPr lang="en-US" dirty="0"/>
           </a:p>
@@ -1399,7 +1457,7 @@
             <a:fld id="{B61BEF0D-F0BB-DE4B-95CE-6DB70DBA9567}" type="datetimeFigureOut">
               <a:rPr lang="en-US" smtClean="0"/>
               <a:pPr/>
-              <a:t>3/25/2015</a:t>
+              <a:t>3/26/2015</a:t>
             </a:fld>
             <a:endParaRPr lang="en-US" dirty="0"/>
           </a:p>
@@ -1595,7 +1653,7 @@
             <a:fld id="{B61BEF0D-F0BB-DE4B-95CE-6DB70DBA9567}" type="datetimeFigureOut">
               <a:rPr lang="en-US" smtClean="0"/>
               <a:pPr/>
-              <a:t>3/25/2015</a:t>
+              <a:t>3/26/2015</a:t>
             </a:fld>
             <a:endParaRPr lang="en-US" dirty="0"/>
           </a:p>
@@ -1870,7 +1928,7 @@
             <a:fld id="{B61BEF0D-F0BB-DE4B-95CE-6DB70DBA9567}" type="datetimeFigureOut">
               <a:rPr lang="en-US" smtClean="0"/>
               <a:pPr/>
-              <a:t>3/25/2015</a:t>
+              <a:t>3/26/2015</a:t>
             </a:fld>
             <a:endParaRPr lang="en-US" dirty="0"/>
           </a:p>
@@ -2213,7 +2271,7 @@
             <a:fld id="{B61BEF0D-F0BB-DE4B-95CE-6DB70DBA9567}" type="datetimeFigureOut">
               <a:rPr lang="en-US" smtClean="0"/>
               <a:pPr/>
-              <a:t>3/25/2015</a:t>
+              <a:t>3/26/2015</a:t>
             </a:fld>
             <a:endParaRPr lang="en-US" dirty="0"/>
           </a:p>
@@ -2838,7 +2896,7 @@
             <a:fld id="{B61BEF0D-F0BB-DE4B-95CE-6DB70DBA9567}" type="datetimeFigureOut">
               <a:rPr lang="en-US" smtClean="0"/>
               <a:pPr/>
-              <a:t>3/25/2015</a:t>
+              <a:t>3/26/2015</a:t>
             </a:fld>
             <a:endParaRPr lang="en-US" dirty="0"/>
           </a:p>
@@ -3700,7 +3758,7 @@
             <a:fld id="{B61BEF0D-F0BB-DE4B-95CE-6DB70DBA9567}" type="datetimeFigureOut">
               <a:rPr lang="en-US" smtClean="0"/>
               <a:pPr/>
-              <a:t>3/25/2015</a:t>
+              <a:t>3/26/2015</a:t>
             </a:fld>
             <a:endParaRPr lang="en-US" dirty="0"/>
           </a:p>
@@ -3872,7 +3930,7 @@
             <a:fld id="{B61BEF0D-F0BB-DE4B-95CE-6DB70DBA9567}" type="datetimeFigureOut">
               <a:rPr lang="en-US" smtClean="0"/>
               <a:pPr/>
-              <a:t>3/25/2015</a:t>
+              <a:t>3/26/2015</a:t>
             </a:fld>
             <a:endParaRPr lang="en-US" dirty="0"/>
           </a:p>
@@ -4054,7 +4112,7 @@
             <a:fld id="{B61BEF0D-F0BB-DE4B-95CE-6DB70DBA9567}" type="datetimeFigureOut">
               <a:rPr lang="en-US" smtClean="0"/>
               <a:pPr/>
-              <a:t>3/25/2015</a:t>
+              <a:t>3/26/2015</a:t>
             </a:fld>
             <a:endParaRPr lang="en-US" dirty="0"/>
           </a:p>
@@ -4226,7 +4284,7 @@
             <a:fld id="{B61BEF0D-F0BB-DE4B-95CE-6DB70DBA9567}" type="datetimeFigureOut">
               <a:rPr lang="en-US" smtClean="0"/>
               <a:pPr/>
-              <a:t>3/25/2015</a:t>
+              <a:t>3/26/2015</a:t>
             </a:fld>
             <a:endParaRPr lang="en-US" dirty="0"/>
           </a:p>
@@ -4475,7 +4533,7 @@
             <a:fld id="{B61BEF0D-F0BB-DE4B-95CE-6DB70DBA9567}" type="datetimeFigureOut">
               <a:rPr lang="en-US" smtClean="0"/>
               <a:pPr/>
-              <a:t>3/25/2015</a:t>
+              <a:t>3/26/2015</a:t>
             </a:fld>
             <a:endParaRPr lang="en-US" dirty="0"/>
           </a:p>
@@ -4769,7 +4827,7 @@
             <a:fld id="{B61BEF0D-F0BB-DE4B-95CE-6DB70DBA9567}" type="datetimeFigureOut">
               <a:rPr lang="en-US" smtClean="0"/>
               <a:pPr/>
-              <a:t>3/25/2015</a:t>
+              <a:t>3/26/2015</a:t>
             </a:fld>
             <a:endParaRPr lang="en-US" dirty="0"/>
           </a:p>
@@ -5215,7 +5273,7 @@
             <a:fld id="{B61BEF0D-F0BB-DE4B-95CE-6DB70DBA9567}" type="datetimeFigureOut">
               <a:rPr lang="en-US" smtClean="0"/>
               <a:pPr/>
-              <a:t>3/25/2015</a:t>
+              <a:t>3/26/2015</a:t>
             </a:fld>
             <a:endParaRPr lang="en-US" dirty="0"/>
           </a:p>
@@ -5335,7 +5393,7 @@
             <a:fld id="{B61BEF0D-F0BB-DE4B-95CE-6DB70DBA9567}" type="datetimeFigureOut">
               <a:rPr lang="en-US" smtClean="0"/>
               <a:pPr/>
-              <a:t>3/25/2015</a:t>
+              <a:t>3/26/2015</a:t>
             </a:fld>
             <a:endParaRPr lang="en-US" dirty="0"/>
           </a:p>
@@ -5432,7 +5490,7 @@
             <a:fld id="{B61BEF0D-F0BB-DE4B-95CE-6DB70DBA9567}" type="datetimeFigureOut">
               <a:rPr lang="en-US" smtClean="0"/>
               <a:pPr/>
-              <a:t>3/25/2015</a:t>
+              <a:t>3/26/2015</a:t>
             </a:fld>
             <a:endParaRPr lang="en-US" dirty="0"/>
           </a:p>
@@ -5713,7 +5771,7 @@
             <a:fld id="{B61BEF0D-F0BB-DE4B-95CE-6DB70DBA9567}" type="datetimeFigureOut">
               <a:rPr lang="en-US" smtClean="0"/>
               <a:pPr/>
-              <a:t>3/25/2015</a:t>
+              <a:t>3/26/2015</a:t>
             </a:fld>
             <a:endParaRPr lang="en-US" dirty="0"/>
           </a:p>
@@ -5990,7 +6048,7 @@
             <a:fld id="{B61BEF0D-F0BB-DE4B-95CE-6DB70DBA9567}" type="datetimeFigureOut">
               <a:rPr lang="en-US" smtClean="0"/>
               <a:pPr/>
-              <a:t>3/25/2015</a:t>
+              <a:t>3/26/2015</a:t>
             </a:fld>
             <a:endParaRPr lang="en-US" dirty="0"/>
           </a:p>
@@ -6421,7 +6479,7 @@
             <a:fld id="{B61BEF0D-F0BB-DE4B-95CE-6DB70DBA9567}" type="datetimeFigureOut">
               <a:rPr lang="en-US" smtClean="0"/>
               <a:pPr/>
-              <a:t>3/25/2015</a:t>
+              <a:t>3/26/2015</a:t>
             </a:fld>
             <a:endParaRPr lang="en-US" dirty="0"/>
           </a:p>

</xml_diff>

<commit_message>
Added codes to slide
</commit_message>
<xml_diff>
--- a/Mid-term presentation/Second/DBL Embedded Systems.pptx
+++ b/Mid-term presentation/Second/DBL Embedded Systems.pptx
@@ -7715,7 +7715,6 @@
               <a:rPr lang="en-GB" dirty="0" smtClean="0"/>
               <a:t>Amount of parts</a:t>
             </a:r>
-            <a:endParaRPr lang="en-GB" dirty="0" smtClean="0"/>
           </a:p>
         </p:txBody>
       </p:sp>
@@ -8611,14 +8610,43 @@
           <a:chExt cx="0" cy="0"/>
         </a:xfrm>
       </p:grpSpPr>
-      <p:sp>
-        <p:nvSpPr>
-          <p:cNvPr id="3" name="Content Placeholder 2"/>
-          <p:cNvSpPr>
-            <a:spLocks noGrp="1"/>
-          </p:cNvSpPr>
+      <p:pic>
+        <p:nvPicPr>
+          <p:cNvPr id="4" name="Content Placeholder 3"/>
+          <p:cNvPicPr>
+            <a:picLocks noGrp="1" noChangeAspect="1"/>
+          </p:cNvPicPr>
           <p:nvPr>
             <p:ph idx="1"/>
+          </p:nvPr>
+        </p:nvPicPr>
+        <p:blipFill>
+          <a:blip r:embed="rId3">
+            <a:extLst>
+              <a:ext uri="{28A0092B-C50C-407E-A947-70E740481C1C}">
+                <a14:useLocalDpi xmlns:a14="http://schemas.microsoft.com/office/drawing/2010/main" val="0"/>
+              </a:ext>
+            </a:extLst>
+          </a:blip>
+          <a:stretch>
+            <a:fillRect/>
+          </a:stretch>
+        </p:blipFill>
+        <p:spPr>
+          <a:xfrm>
+            <a:off x="646111" y="1955817"/>
+            <a:ext cx="4918110" cy="2745294"/>
+          </a:xfrm>
+        </p:spPr>
+      </p:pic>
+      <p:sp>
+        <p:nvSpPr>
+          <p:cNvPr id="2" name="Titel 1"/>
+          <p:cNvSpPr>
+            <a:spLocks noGrp="1"/>
+          </p:cNvSpPr>
+          <p:nvPr>
+            <p:ph type="title"/>
           </p:nvPr>
         </p:nvSpPr>
         <p:spPr/>
@@ -8626,30 +8654,145 @@
           <a:bodyPr/>
           <a:lstStyle/>
           <a:p>
-            <a:endParaRPr lang="en-GB" dirty="0"/>
-          </a:p>
-        </p:txBody>
-      </p:sp>
-      <p:sp>
-        <p:nvSpPr>
-          <p:cNvPr id="2" name="Titel 1"/>
-          <p:cNvSpPr>
-            <a:spLocks noGrp="1"/>
-          </p:cNvSpPr>
-          <p:nvPr>
-            <p:ph type="title"/>
-          </p:nvPr>
-        </p:nvSpPr>
-        <p:spPr/>
-        <p:txBody>
-          <a:bodyPr/>
-          <a:lstStyle/>
-          <a:p>
             <a:r>
               <a:rPr lang="nl-NL" dirty="0" smtClean="0"/>
               <a:t>Software Design</a:t>
             </a:r>
             <a:endParaRPr lang="en-GB" dirty="0"/>
+          </a:p>
+        </p:txBody>
+      </p:sp>
+      <p:pic>
+        <p:nvPicPr>
+          <p:cNvPr id="5" name="Picture 4"/>
+          <p:cNvPicPr>
+            <a:picLocks noChangeAspect="1"/>
+          </p:cNvPicPr>
+          <p:nvPr/>
+        </p:nvPicPr>
+        <p:blipFill>
+          <a:blip r:embed="rId4">
+            <a:extLst>
+              <a:ext uri="{28A0092B-C50C-407E-A947-70E740481C1C}">
+                <a14:useLocalDpi xmlns:a14="http://schemas.microsoft.com/office/drawing/2010/main" val="0"/>
+              </a:ext>
+            </a:extLst>
+          </a:blip>
+          <a:stretch>
+            <a:fillRect/>
+          </a:stretch>
+        </p:blipFill>
+        <p:spPr>
+          <a:xfrm>
+            <a:off x="6118200" y="1853248"/>
+            <a:ext cx="5052395" cy="4643786"/>
+          </a:xfrm>
+          <a:prstGeom prst="rect">
+            <a:avLst/>
+          </a:prstGeom>
+        </p:spPr>
+      </p:pic>
+      <p:sp>
+        <p:nvSpPr>
+          <p:cNvPr id="6" name="TextBox 5"/>
+          <p:cNvSpPr txBox="1"/>
+          <p:nvPr/>
+        </p:nvSpPr>
+        <p:spPr>
+          <a:xfrm>
+            <a:off x="2720923" y="1586485"/>
+            <a:ext cx="768486" cy="369332"/>
+          </a:xfrm>
+          <a:prstGeom prst="rect">
+            <a:avLst/>
+          </a:prstGeom>
+          <a:noFill/>
+        </p:spPr>
+        <p:txBody>
+          <a:bodyPr wrap="square" rtlCol="0">
+            <a:spAutoFit/>
+          </a:bodyPr>
+          <a:lstStyle/>
+          <a:p>
+            <a:r>
+              <a:rPr lang="en-GB" dirty="0" smtClean="0"/>
+              <a:t>Java</a:t>
+            </a:r>
+            <a:endParaRPr lang="en-GB" dirty="0"/>
+          </a:p>
+        </p:txBody>
+      </p:sp>
+      <p:sp>
+        <p:nvSpPr>
+          <p:cNvPr id="7" name="TextBox 6"/>
+          <p:cNvSpPr txBox="1"/>
+          <p:nvPr/>
+        </p:nvSpPr>
+        <p:spPr>
+          <a:xfrm>
+            <a:off x="8333112" y="1483916"/>
+            <a:ext cx="622570" cy="369332"/>
+          </a:xfrm>
+          <a:prstGeom prst="rect">
+            <a:avLst/>
+          </a:prstGeom>
+          <a:noFill/>
+        </p:spPr>
+        <p:txBody>
+          <a:bodyPr wrap="square" rtlCol="0">
+            <a:spAutoFit/>
+          </a:bodyPr>
+          <a:lstStyle/>
+          <a:p>
+            <a:r>
+              <a:rPr lang="en-GB" dirty="0" smtClean="0"/>
+              <a:t>PHP</a:t>
+            </a:r>
+            <a:endParaRPr lang="en-GB" dirty="0"/>
+          </a:p>
+        </p:txBody>
+      </p:sp>
+      <p:sp>
+        <p:nvSpPr>
+          <p:cNvPr id="9" name="Bent Arrow 8"/>
+          <p:cNvSpPr/>
+          <p:nvPr/>
+        </p:nvSpPr>
+        <p:spPr>
+          <a:xfrm flipV="1">
+            <a:off x="2700679" y="4872515"/>
+            <a:ext cx="2799825" cy="1235413"/>
+          </a:xfrm>
+          <a:prstGeom prst="bentArrow">
+            <a:avLst/>
+          </a:prstGeom>
+        </p:spPr>
+        <p:style>
+          <a:lnRef idx="2">
+            <a:schemeClr val="accent1">
+              <a:shade val="50000"/>
+            </a:schemeClr>
+          </a:lnRef>
+          <a:fillRef idx="1">
+            <a:schemeClr val="accent1"/>
+          </a:fillRef>
+          <a:effectRef idx="0">
+            <a:schemeClr val="accent1"/>
+          </a:effectRef>
+          <a:fontRef idx="minor">
+            <a:schemeClr val="lt1"/>
+          </a:fontRef>
+        </p:style>
+        <p:txBody>
+          <a:bodyPr rtlCol="0" anchor="ctr"/>
+          <a:lstStyle/>
+          <a:p>
+            <a:pPr algn="ctr"/>
+            <a:endParaRPr lang="en-GB">
+              <a:solidFill>
+                <a:schemeClr val="tx1"/>
+              </a:solidFill>
+            </a:endParaRPr>
           </a:p>
         </p:txBody>
       </p:sp>
@@ -8669,9 +8812,169 @@
   <p:timing>
     <p:tnLst>
       <p:par>
-        <p:cTn id="1" dur="indefinite" restart="never" nodeType="tmRoot"/>
+        <p:cTn id="1" dur="indefinite" restart="never" nodeType="tmRoot">
+          <p:childTnLst>
+            <p:seq concurrent="1" nextAc="seek">
+              <p:cTn id="2" dur="indefinite" nodeType="mainSeq">
+                <p:childTnLst>
+                  <p:par>
+                    <p:cTn id="3" fill="hold">
+                      <p:stCondLst>
+                        <p:cond delay="indefinite"/>
+                      </p:stCondLst>
+                      <p:childTnLst>
+                        <p:par>
+                          <p:cTn id="4" fill="hold">
+                            <p:stCondLst>
+                              <p:cond delay="0"/>
+                            </p:stCondLst>
+                            <p:childTnLst>
+                              <p:par>
+                                <p:cTn id="5" presetID="1" presetClass="entr" presetSubtype="0" fill="hold" nodeType="clickEffect">
+                                  <p:stCondLst>
+                                    <p:cond delay="0"/>
+                                  </p:stCondLst>
+                                  <p:childTnLst>
+                                    <p:set>
+                                      <p:cBhvr>
+                                        <p:cTn id="6" dur="1" fill="hold">
+                                          <p:stCondLst>
+                                            <p:cond delay="0"/>
+                                          </p:stCondLst>
+                                        </p:cTn>
+                                        <p:tgtEl>
+                                          <p:spTgt spid="4"/>
+                                        </p:tgtEl>
+                                        <p:attrNameLst>
+                                          <p:attrName>style.visibility</p:attrName>
+                                        </p:attrNameLst>
+                                      </p:cBhvr>
+                                      <p:to>
+                                        <p:strVal val="visible"/>
+                                      </p:to>
+                                    </p:set>
+                                  </p:childTnLst>
+                                </p:cTn>
+                              </p:par>
+                            </p:childTnLst>
+                          </p:cTn>
+                        </p:par>
+                      </p:childTnLst>
+                    </p:cTn>
+                  </p:par>
+                  <p:par>
+                    <p:cTn id="7" fill="hold">
+                      <p:stCondLst>
+                        <p:cond delay="indefinite"/>
+                      </p:stCondLst>
+                      <p:childTnLst>
+                        <p:par>
+                          <p:cTn id="8" fill="hold">
+                            <p:stCondLst>
+                              <p:cond delay="0"/>
+                            </p:stCondLst>
+                            <p:childTnLst>
+                              <p:par>
+                                <p:cTn id="9" presetID="22" presetClass="entr" presetSubtype="8" fill="hold" grpId="0" nodeType="clickEffect">
+                                  <p:stCondLst>
+                                    <p:cond delay="0"/>
+                                  </p:stCondLst>
+                                  <p:childTnLst>
+                                    <p:set>
+                                      <p:cBhvr>
+                                        <p:cTn id="10" dur="1" fill="hold">
+                                          <p:stCondLst>
+                                            <p:cond delay="0"/>
+                                          </p:stCondLst>
+                                        </p:cTn>
+                                        <p:tgtEl>
+                                          <p:spTgt spid="9"/>
+                                        </p:tgtEl>
+                                        <p:attrNameLst>
+                                          <p:attrName>style.visibility</p:attrName>
+                                        </p:attrNameLst>
+                                      </p:cBhvr>
+                                      <p:to>
+                                        <p:strVal val="visible"/>
+                                      </p:to>
+                                    </p:set>
+                                    <p:animEffect transition="in" filter="wipe(left)">
+                                      <p:cBhvr>
+                                        <p:cTn id="11" dur="500"/>
+                                        <p:tgtEl>
+                                          <p:spTgt spid="9"/>
+                                        </p:tgtEl>
+                                      </p:cBhvr>
+                                    </p:animEffect>
+                                  </p:childTnLst>
+                                </p:cTn>
+                              </p:par>
+                            </p:childTnLst>
+                          </p:cTn>
+                        </p:par>
+                        <p:par>
+                          <p:cTn id="12" fill="hold">
+                            <p:stCondLst>
+                              <p:cond delay="500"/>
+                            </p:stCondLst>
+                            <p:childTnLst>
+                              <p:par>
+                                <p:cTn id="13" presetID="1" presetClass="entr" presetSubtype="0" fill="hold" nodeType="afterEffect">
+                                  <p:stCondLst>
+                                    <p:cond delay="0"/>
+                                  </p:stCondLst>
+                                  <p:childTnLst>
+                                    <p:set>
+                                      <p:cBhvr>
+                                        <p:cTn id="14" dur="1" fill="hold">
+                                          <p:stCondLst>
+                                            <p:cond delay="0"/>
+                                          </p:stCondLst>
+                                        </p:cTn>
+                                        <p:tgtEl>
+                                          <p:spTgt spid="5"/>
+                                        </p:tgtEl>
+                                        <p:attrNameLst>
+                                          <p:attrName>style.visibility</p:attrName>
+                                        </p:attrNameLst>
+                                      </p:cBhvr>
+                                      <p:to>
+                                        <p:strVal val="visible"/>
+                                      </p:to>
+                                    </p:set>
+                                  </p:childTnLst>
+                                </p:cTn>
+                              </p:par>
+                            </p:childTnLst>
+                          </p:cTn>
+                        </p:par>
+                      </p:childTnLst>
+                    </p:cTn>
+                  </p:par>
+                </p:childTnLst>
+              </p:cTn>
+              <p:prevCondLst>
+                <p:cond evt="onPrev" delay="0">
+                  <p:tgtEl>
+                    <p:sldTgt/>
+                  </p:tgtEl>
+                </p:cond>
+              </p:prevCondLst>
+              <p:nextCondLst>
+                <p:cond evt="onNext" delay="0">
+                  <p:tgtEl>
+                    <p:sldTgt/>
+                  </p:tgtEl>
+                </p:cond>
+              </p:nextCondLst>
+            </p:seq>
+          </p:childTnLst>
+        </p:cTn>
       </p:par>
     </p:tnLst>
+    <p:bldLst>
+      <p:bldP spid="9" grpId="0" animBg="1"/>
+    </p:bldLst>
   </p:timing>
 </p:sld>
 </file>

</xml_diff>

<commit_message>
Added summary at the end and added colour sensor part
</commit_message>
<xml_diff>
--- a/Mid-term presentation/Second/DBL Embedded Systems.pptx
+++ b/Mid-term presentation/Second/DBL Embedded Systems.pptx
@@ -2,7 +2,7 @@
 <file path=ppt/presentation.xml><?xml version="1.0" encoding="utf-8"?>
 <p:presentation xmlns:a="http://schemas.openxmlformats.org/drawingml/2006/main" xmlns:r="http://schemas.openxmlformats.org/officeDocument/2006/relationships" xmlns:p="http://schemas.openxmlformats.org/presentationml/2006/main" autoCompressPictures="0">
   <p:sldMasterIdLst>
-    <p:sldMasterId id="2147483705" r:id="rId1"/>
+    <p:sldMasterId id="2147483764" r:id="rId1"/>
   </p:sldMasterIdLst>
   <p:notesMasterIdLst>
     <p:notesMasterId r:id="rId9"/>
@@ -756,8 +756,15 @@
           <a:p>
             <a:r>
               <a:rPr lang="en-US" dirty="0" smtClean="0"/>
-              <a:t>tilt</a:t>
-            </a:r>
+              <a:t>Tilt</a:t>
+            </a:r>
+          </a:p>
+          <a:p>
+            <a:r>
+              <a:rPr lang="en-US" smtClean="0"/>
+              <a:t>Angle</a:t>
+            </a:r>
+            <a:endParaRPr lang="en-US" dirty="0" smtClean="0"/>
           </a:p>
           <a:p>
             <a:r>
@@ -1233,7 +1240,7 @@
     </p:spTree>
     <p:extLst>
       <p:ext uri="{BB962C8B-B14F-4D97-AF65-F5344CB8AC3E}">
-        <p14:creationId xmlns:p14="http://schemas.microsoft.com/office/powerpoint/2010/main" val="3098725363"/>
+        <p14:creationId xmlns:p14="http://schemas.microsoft.com/office/powerpoint/2010/main" val="1288133839"/>
       </p:ext>
     </p:extLst>
   </p:cSld>
@@ -1510,7 +1517,7 @@
     </p:spTree>
     <p:extLst>
       <p:ext uri="{BB962C8B-B14F-4D97-AF65-F5344CB8AC3E}">
-        <p14:creationId xmlns:p14="http://schemas.microsoft.com/office/powerpoint/2010/main" val="3776553760"/>
+        <p14:creationId xmlns:p14="http://schemas.microsoft.com/office/powerpoint/2010/main" val="2891758231"/>
       </p:ext>
     </p:extLst>
   </p:cSld>
@@ -1706,7 +1713,7 @@
     </p:spTree>
     <p:extLst>
       <p:ext uri="{BB962C8B-B14F-4D97-AF65-F5344CB8AC3E}">
-        <p14:creationId xmlns:p14="http://schemas.microsoft.com/office/powerpoint/2010/main" val="1722527210"/>
+        <p14:creationId xmlns:p14="http://schemas.microsoft.com/office/powerpoint/2010/main" val="1394369622"/>
       </p:ext>
     </p:extLst>
   </p:cSld>
@@ -2075,7 +2082,7 @@
     </p:spTree>
     <p:extLst>
       <p:ext uri="{BB962C8B-B14F-4D97-AF65-F5344CB8AC3E}">
-        <p14:creationId xmlns:p14="http://schemas.microsoft.com/office/powerpoint/2010/main" val="2557264307"/>
+        <p14:creationId xmlns:p14="http://schemas.microsoft.com/office/powerpoint/2010/main" val="3872425156"/>
       </p:ext>
     </p:extLst>
   </p:cSld>
@@ -2324,7 +2331,7 @@
     </p:spTree>
     <p:extLst>
       <p:ext uri="{BB962C8B-B14F-4D97-AF65-F5344CB8AC3E}">
-        <p14:creationId xmlns:p14="http://schemas.microsoft.com/office/powerpoint/2010/main" val="4047599054"/>
+        <p14:creationId xmlns:p14="http://schemas.microsoft.com/office/powerpoint/2010/main" val="2835572"/>
       </p:ext>
     </p:extLst>
   </p:cSld>
@@ -2949,7 +2956,7 @@
     </p:spTree>
     <p:extLst>
       <p:ext uri="{BB962C8B-B14F-4D97-AF65-F5344CB8AC3E}">
-        <p14:creationId xmlns:p14="http://schemas.microsoft.com/office/powerpoint/2010/main" val="2118799565"/>
+        <p14:creationId xmlns:p14="http://schemas.microsoft.com/office/powerpoint/2010/main" val="41293017"/>
       </p:ext>
     </p:extLst>
   </p:cSld>
@@ -3811,7 +3818,7 @@
     </p:spTree>
     <p:extLst>
       <p:ext uri="{BB962C8B-B14F-4D97-AF65-F5344CB8AC3E}">
-        <p14:creationId xmlns:p14="http://schemas.microsoft.com/office/powerpoint/2010/main" val="939574128"/>
+        <p14:creationId xmlns:p14="http://schemas.microsoft.com/office/powerpoint/2010/main" val="3921110475"/>
       </p:ext>
     </p:extLst>
   </p:cSld>
@@ -3983,7 +3990,7 @@
     </p:spTree>
     <p:extLst>
       <p:ext uri="{BB962C8B-B14F-4D97-AF65-F5344CB8AC3E}">
-        <p14:creationId xmlns:p14="http://schemas.microsoft.com/office/powerpoint/2010/main" val="3704712806"/>
+        <p14:creationId xmlns:p14="http://schemas.microsoft.com/office/powerpoint/2010/main" val="91633699"/>
       </p:ext>
     </p:extLst>
   </p:cSld>
@@ -4165,7 +4172,7 @@
     </p:spTree>
     <p:extLst>
       <p:ext uri="{BB962C8B-B14F-4D97-AF65-F5344CB8AC3E}">
-        <p14:creationId xmlns:p14="http://schemas.microsoft.com/office/powerpoint/2010/main" val="1758004023"/>
+        <p14:creationId xmlns:p14="http://schemas.microsoft.com/office/powerpoint/2010/main" val="712063296"/>
       </p:ext>
     </p:extLst>
   </p:cSld>
@@ -4337,7 +4344,7 @@
     </p:spTree>
     <p:extLst>
       <p:ext uri="{BB962C8B-B14F-4D97-AF65-F5344CB8AC3E}">
-        <p14:creationId xmlns:p14="http://schemas.microsoft.com/office/powerpoint/2010/main" val="196062791"/>
+        <p14:creationId xmlns:p14="http://schemas.microsoft.com/office/powerpoint/2010/main" val="2794462215"/>
       </p:ext>
     </p:extLst>
   </p:cSld>
@@ -4586,7 +4593,7 @@
     </p:spTree>
     <p:extLst>
       <p:ext uri="{BB962C8B-B14F-4D97-AF65-F5344CB8AC3E}">
-        <p14:creationId xmlns:p14="http://schemas.microsoft.com/office/powerpoint/2010/main" val="3729421388"/>
+        <p14:creationId xmlns:p14="http://schemas.microsoft.com/office/powerpoint/2010/main" val="2295339870"/>
       </p:ext>
     </p:extLst>
   </p:cSld>
@@ -4880,7 +4887,7 @@
     </p:spTree>
     <p:extLst>
       <p:ext uri="{BB962C8B-B14F-4D97-AF65-F5344CB8AC3E}">
-        <p14:creationId xmlns:p14="http://schemas.microsoft.com/office/powerpoint/2010/main" val="2844524988"/>
+        <p14:creationId xmlns:p14="http://schemas.microsoft.com/office/powerpoint/2010/main" val="1065016479"/>
       </p:ext>
     </p:extLst>
   </p:cSld>
@@ -5326,7 +5333,7 @@
     </p:spTree>
     <p:extLst>
       <p:ext uri="{BB962C8B-B14F-4D97-AF65-F5344CB8AC3E}">
-        <p14:creationId xmlns:p14="http://schemas.microsoft.com/office/powerpoint/2010/main" val="3183389166"/>
+        <p14:creationId xmlns:p14="http://schemas.microsoft.com/office/powerpoint/2010/main" val="3342677753"/>
       </p:ext>
     </p:extLst>
   </p:cSld>
@@ -5446,7 +5453,7 @@
     </p:spTree>
     <p:extLst>
       <p:ext uri="{BB962C8B-B14F-4D97-AF65-F5344CB8AC3E}">
-        <p14:creationId xmlns:p14="http://schemas.microsoft.com/office/powerpoint/2010/main" val="2277457438"/>
+        <p14:creationId xmlns:p14="http://schemas.microsoft.com/office/powerpoint/2010/main" val="1157807365"/>
       </p:ext>
     </p:extLst>
   </p:cSld>
@@ -5543,7 +5550,7 @@
     </p:spTree>
     <p:extLst>
       <p:ext uri="{BB962C8B-B14F-4D97-AF65-F5344CB8AC3E}">
-        <p14:creationId xmlns:p14="http://schemas.microsoft.com/office/powerpoint/2010/main" val="2222828966"/>
+        <p14:creationId xmlns:p14="http://schemas.microsoft.com/office/powerpoint/2010/main" val="3160766140"/>
       </p:ext>
     </p:extLst>
   </p:cSld>
@@ -5824,7 +5831,7 @@
     </p:spTree>
     <p:extLst>
       <p:ext uri="{BB962C8B-B14F-4D97-AF65-F5344CB8AC3E}">
-        <p14:creationId xmlns:p14="http://schemas.microsoft.com/office/powerpoint/2010/main" val="1820176974"/>
+        <p14:creationId xmlns:p14="http://schemas.microsoft.com/office/powerpoint/2010/main" val="2260332348"/>
       </p:ext>
     </p:extLst>
   </p:cSld>
@@ -6101,7 +6108,7 @@
     </p:spTree>
     <p:extLst>
       <p:ext uri="{BB962C8B-B14F-4D97-AF65-F5344CB8AC3E}">
-        <p14:creationId xmlns:p14="http://schemas.microsoft.com/office/powerpoint/2010/main" val="4029173831"/>
+        <p14:creationId xmlns:p14="http://schemas.microsoft.com/office/powerpoint/2010/main" val="2097285466"/>
       </p:ext>
     </p:extLst>
   </p:cSld>
@@ -6569,29 +6576,29 @@
     </p:spTree>
     <p:extLst>
       <p:ext uri="{BB962C8B-B14F-4D97-AF65-F5344CB8AC3E}">
-        <p14:creationId xmlns:p14="http://schemas.microsoft.com/office/powerpoint/2010/main" val="3733790578"/>
+        <p14:creationId xmlns:p14="http://schemas.microsoft.com/office/powerpoint/2010/main" val="1738250434"/>
       </p:ext>
     </p:extLst>
   </p:cSld>
   <p:clrMap bg1="dk1" tx1="lt1" bg2="dk2" tx2="lt2" accent1="accent1" accent2="accent2" accent3="accent3" accent4="accent4" accent5="accent5" accent6="accent6" hlink="hlink" folHlink="folHlink"/>
   <p:sldLayoutIdLst>
-    <p:sldLayoutId id="2147483706" r:id="rId1"/>
-    <p:sldLayoutId id="2147483707" r:id="rId2"/>
-    <p:sldLayoutId id="2147483708" r:id="rId3"/>
-    <p:sldLayoutId id="2147483709" r:id="rId4"/>
-    <p:sldLayoutId id="2147483710" r:id="rId5"/>
-    <p:sldLayoutId id="2147483711" r:id="rId6"/>
-    <p:sldLayoutId id="2147483712" r:id="rId7"/>
-    <p:sldLayoutId id="2147483713" r:id="rId8"/>
-    <p:sldLayoutId id="2147483714" r:id="rId9"/>
-    <p:sldLayoutId id="2147483715" r:id="rId10"/>
-    <p:sldLayoutId id="2147483716" r:id="rId11"/>
-    <p:sldLayoutId id="2147483717" r:id="rId12"/>
-    <p:sldLayoutId id="2147483718" r:id="rId13"/>
-    <p:sldLayoutId id="2147483719" r:id="rId14"/>
-    <p:sldLayoutId id="2147483720" r:id="rId15"/>
-    <p:sldLayoutId id="2147483721" r:id="rId16"/>
-    <p:sldLayoutId id="2147483722" r:id="rId17"/>
+    <p:sldLayoutId id="2147483765" r:id="rId1"/>
+    <p:sldLayoutId id="2147483766" r:id="rId2"/>
+    <p:sldLayoutId id="2147483767" r:id="rId3"/>
+    <p:sldLayoutId id="2147483768" r:id="rId4"/>
+    <p:sldLayoutId id="2147483769" r:id="rId5"/>
+    <p:sldLayoutId id="2147483770" r:id="rId6"/>
+    <p:sldLayoutId id="2147483771" r:id="rId7"/>
+    <p:sldLayoutId id="2147483772" r:id="rId8"/>
+    <p:sldLayoutId id="2147483773" r:id="rId9"/>
+    <p:sldLayoutId id="2147483774" r:id="rId10"/>
+    <p:sldLayoutId id="2147483775" r:id="rId11"/>
+    <p:sldLayoutId id="2147483776" r:id="rId12"/>
+    <p:sldLayoutId id="2147483777" r:id="rId13"/>
+    <p:sldLayoutId id="2147483778" r:id="rId14"/>
+    <p:sldLayoutId id="2147483779" r:id="rId15"/>
+    <p:sldLayoutId id="2147483780" r:id="rId16"/>
+    <p:sldLayoutId id="2147483781" r:id="rId17"/>
   </p:sldLayoutIdLst>
   <p:txStyles>
     <p:titleStyle>
@@ -8611,6 +8618,29 @@
           <a:chExt cx="0" cy="0"/>
         </a:xfrm>
       </p:grpSpPr>
+      <p:sp>
+        <p:nvSpPr>
+          <p:cNvPr id="2" name="Titel 1"/>
+          <p:cNvSpPr>
+            <a:spLocks noGrp="1"/>
+          </p:cNvSpPr>
+          <p:nvPr>
+            <p:ph type="title"/>
+          </p:nvPr>
+        </p:nvSpPr>
+        <p:spPr/>
+        <p:txBody>
+          <a:bodyPr/>
+          <a:lstStyle/>
+          <a:p>
+            <a:r>
+              <a:rPr lang="nl-NL" dirty="0" smtClean="0"/>
+              <a:t>Software Design</a:t>
+            </a:r>
+            <a:endParaRPr lang="en-GB" dirty="0"/>
+          </a:p>
+        </p:txBody>
+      </p:sp>
       <p:pic>
         <p:nvPicPr>
           <p:cNvPr id="4" name="Content Placeholder 3"/>
@@ -8640,29 +8670,6 @@
           </a:xfrm>
         </p:spPr>
       </p:pic>
-      <p:sp>
-        <p:nvSpPr>
-          <p:cNvPr id="2" name="Titel 1"/>
-          <p:cNvSpPr>
-            <a:spLocks noGrp="1"/>
-          </p:cNvSpPr>
-          <p:nvPr>
-            <p:ph type="title"/>
-          </p:nvPr>
-        </p:nvSpPr>
-        <p:spPr/>
-        <p:txBody>
-          <a:bodyPr/>
-          <a:lstStyle/>
-          <a:p>
-            <a:r>
-              <a:rPr lang="nl-NL" dirty="0" smtClean="0"/>
-              <a:t>Software Design</a:t>
-            </a:r>
-            <a:endParaRPr lang="en-GB" dirty="0"/>
-          </a:p>
-        </p:txBody>
-      </p:sp>
       <p:pic>
         <p:nvPicPr>
           <p:cNvPr id="5" name="Picture 4"/>
@@ -9035,7 +9042,50 @@
           <a:bodyPr/>
           <a:lstStyle/>
           <a:p>
-            <a:endParaRPr lang="en-GB"/>
+            <a:pPr marL="457200" lvl="1" indent="0">
+              <a:buNone/>
+            </a:pPr>
+            <a:r>
+              <a:rPr lang="en-GB" dirty="0" smtClean="0"/>
+              <a:t>Machine Design is done</a:t>
+            </a:r>
+          </a:p>
+          <a:p>
+            <a:pPr marL="457200" lvl="1" indent="0">
+              <a:buNone/>
+            </a:pPr>
+            <a:r>
+              <a:rPr lang="en-GB" dirty="0" smtClean="0"/>
+              <a:t>Machine consists of three parts</a:t>
+            </a:r>
+          </a:p>
+          <a:p>
+            <a:pPr marL="457200" lvl="1" indent="0">
+              <a:buNone/>
+            </a:pPr>
+            <a:r>
+              <a:rPr lang="en-GB" dirty="0" smtClean="0"/>
+              <a:t>Design decisions and design decisions</a:t>
+            </a:r>
+          </a:p>
+          <a:p>
+            <a:pPr marL="457200" lvl="1" indent="0">
+              <a:buNone/>
+            </a:pPr>
+            <a:r>
+              <a:rPr lang="en-GB" dirty="0" smtClean="0"/>
+              <a:t>PHP to Assembly compiler</a:t>
+            </a:r>
+          </a:p>
+          <a:p>
+            <a:pPr marL="457200" lvl="1" indent="0">
+              <a:buNone/>
+            </a:pPr>
+            <a:r>
+              <a:rPr lang="en-GB" dirty="0" smtClean="0"/>
+              <a:t>Validated</a:t>
+            </a:r>
+            <a:endParaRPr lang="en-GB" dirty="0"/>
           </a:p>
         </p:txBody>
       </p:sp>
@@ -9049,6 +9099,13 @@
   <p:clrMapOvr>
     <a:masterClrMapping/>
   </p:clrMapOvr>
+  <p:timing>
+    <p:tnLst>
+      <p:par>
+        <p:cTn id="1" dur="indefinite" restart="never" nodeType="tmRoot"/>
+      </p:par>
+    </p:tnLst>
+  </p:timing>
 </p:sld>
 </file>
 

</xml_diff>

<commit_message>
Added colour detector image to slide
</commit_message>
<xml_diff>
--- a/Mid-term presentation/Second/DBL Embedded Systems.pptx
+++ b/Mid-term presentation/Second/DBL Embedded Systems.pptx
@@ -761,7 +761,7 @@
           </a:p>
           <a:p>
             <a:r>
-              <a:rPr lang="en-US" smtClean="0"/>
+              <a:rPr lang="en-US" dirty="0" smtClean="0"/>
               <a:t>Angle</a:t>
             </a:r>
             <a:endParaRPr lang="en-US" dirty="0" smtClean="0"/>
@@ -8288,6 +8288,36 @@
       </p:pic>
       <p:pic>
         <p:nvPicPr>
+          <p:cNvPr id="5" name="Picture 4"/>
+          <p:cNvPicPr>
+            <a:picLocks noChangeAspect="1"/>
+          </p:cNvPicPr>
+          <p:nvPr/>
+        </p:nvPicPr>
+        <p:blipFill>
+          <a:blip r:embed="rId4">
+            <a:extLst>
+              <a:ext uri="{28A0092B-C50C-407E-A947-70E740481C1C}">
+                <a14:useLocalDpi xmlns:a14="http://schemas.microsoft.com/office/drawing/2010/main" val="0"/>
+              </a:ext>
+            </a:extLst>
+          </a:blip>
+          <a:stretch>
+            <a:fillRect/>
+          </a:stretch>
+        </p:blipFill>
+        <p:spPr>
+          <a:xfrm>
+            <a:off x="906834" y="3190672"/>
+            <a:ext cx="9144000" cy="6858000"/>
+          </a:xfrm>
+          <a:prstGeom prst="rect">
+            <a:avLst/>
+          </a:prstGeom>
+        </p:spPr>
+      </p:pic>
+      <p:pic>
+        <p:nvPicPr>
           <p:cNvPr id="3" name="Picture 2"/>
           <p:cNvPicPr>
             <a:picLocks noChangeAspect="1"/>
@@ -8295,7 +8325,7 @@
           <p:nvPr/>
         </p:nvPicPr>
         <p:blipFill>
-          <a:blip r:embed="rId4">
+          <a:blip r:embed="rId5">
             <a:extLst>
               <a:ext uri="{28A0092B-C50C-407E-A947-70E740481C1C}">
                 <a14:useLocalDpi xmlns:a14="http://schemas.microsoft.com/office/drawing/2010/main" val="0"/>
@@ -8350,14 +8380,183 @@
                             </p:stCondLst>
                             <p:childTnLst>
                               <p:par>
-                                <p:cTn id="5" presetID="10" presetClass="exit" presetSubtype="0" fill="hold" nodeType="clickEffect">
+                                <p:cTn id="5" presetID="53" presetClass="entr" presetSubtype="16" fill="hold" nodeType="clickEffect">
+                                  <p:stCondLst>
+                                    <p:cond delay="0"/>
+                                  </p:stCondLst>
+                                  <p:childTnLst>
+                                    <p:set>
+                                      <p:cBhvr>
+                                        <p:cTn id="6" dur="1" fill="hold">
+                                          <p:stCondLst>
+                                            <p:cond delay="0"/>
+                                          </p:stCondLst>
+                                        </p:cTn>
+                                        <p:tgtEl>
+                                          <p:spTgt spid="5"/>
+                                        </p:tgtEl>
+                                        <p:attrNameLst>
+                                          <p:attrName>style.visibility</p:attrName>
+                                        </p:attrNameLst>
+                                      </p:cBhvr>
+                                      <p:to>
+                                        <p:strVal val="visible"/>
+                                      </p:to>
+                                    </p:set>
+                                    <p:anim calcmode="lin" valueType="num">
+                                      <p:cBhvr>
+                                        <p:cTn id="7" dur="500" fill="hold"/>
+                                        <p:tgtEl>
+                                          <p:spTgt spid="5"/>
+                                        </p:tgtEl>
+                                        <p:attrNameLst>
+                                          <p:attrName>ppt_w</p:attrName>
+                                        </p:attrNameLst>
+                                      </p:cBhvr>
+                                      <p:tavLst>
+                                        <p:tav tm="0">
+                                          <p:val>
+                                            <p:fltVal val="0"/>
+                                          </p:val>
+                                        </p:tav>
+                                        <p:tav tm="100000">
+                                          <p:val>
+                                            <p:strVal val="#ppt_w"/>
+                                          </p:val>
+                                        </p:tav>
+                                      </p:tavLst>
+                                    </p:anim>
+                                    <p:anim calcmode="lin" valueType="num">
+                                      <p:cBhvr>
+                                        <p:cTn id="8" dur="500" fill="hold"/>
+                                        <p:tgtEl>
+                                          <p:spTgt spid="5"/>
+                                        </p:tgtEl>
+                                        <p:attrNameLst>
+                                          <p:attrName>ppt_h</p:attrName>
+                                        </p:attrNameLst>
+                                      </p:cBhvr>
+                                      <p:tavLst>
+                                        <p:tav tm="0">
+                                          <p:val>
+                                            <p:fltVal val="0"/>
+                                          </p:val>
+                                        </p:tav>
+                                        <p:tav tm="100000">
+                                          <p:val>
+                                            <p:strVal val="#ppt_h"/>
+                                          </p:val>
+                                        </p:tav>
+                                      </p:tavLst>
+                                    </p:anim>
+                                    <p:animEffect transition="in" filter="fade">
+                                      <p:cBhvr>
+                                        <p:cTn id="9" dur="500"/>
+                                        <p:tgtEl>
+                                          <p:spTgt spid="5"/>
+                                        </p:tgtEl>
+                                      </p:cBhvr>
+                                    </p:animEffect>
+                                  </p:childTnLst>
+                                </p:cTn>
+                              </p:par>
+                            </p:childTnLst>
+                          </p:cTn>
+                        </p:par>
+                      </p:childTnLst>
+                    </p:cTn>
+                  </p:par>
+                  <p:par>
+                    <p:cTn id="10" fill="hold">
+                      <p:stCondLst>
+                        <p:cond delay="indefinite"/>
+                      </p:stCondLst>
+                      <p:childTnLst>
+                        <p:par>
+                          <p:cTn id="11" fill="hold">
+                            <p:stCondLst>
+                              <p:cond delay="0"/>
+                            </p:stCondLst>
+                            <p:childTnLst>
+                              <p:par>
+                                <p:cTn id="12" presetID="10" presetClass="exit" presetSubtype="0" fill="hold" nodeType="clickEffect">
                                   <p:stCondLst>
                                     <p:cond delay="0"/>
                                   </p:stCondLst>
                                   <p:childTnLst>
                                     <p:animEffect transition="out" filter="fade">
                                       <p:cBhvr>
-                                        <p:cTn id="6" dur="500"/>
+                                        <p:cTn id="13" dur="500"/>
+                                        <p:tgtEl>
+                                          <p:spTgt spid="5"/>
+                                        </p:tgtEl>
+                                      </p:cBhvr>
+                                    </p:animEffect>
+                                    <p:set>
+                                      <p:cBhvr>
+                                        <p:cTn id="14" dur="1" fill="hold">
+                                          <p:stCondLst>
+                                            <p:cond delay="499"/>
+                                          </p:stCondLst>
+                                        </p:cTn>
+                                        <p:tgtEl>
+                                          <p:spTgt spid="5"/>
+                                        </p:tgtEl>
+                                        <p:attrNameLst>
+                                          <p:attrName>style.visibility</p:attrName>
+                                        </p:attrNameLst>
+                                      </p:cBhvr>
+                                      <p:to>
+                                        <p:strVal val="hidden"/>
+                                      </p:to>
+                                    </p:set>
+                                  </p:childTnLst>
+                                </p:cTn>
+                              </p:par>
+                              <p:par>
+                                <p:cTn id="15" presetID="10" presetClass="exit" presetSubtype="0" fill="hold" nodeType="withEffect">
+                                  <p:stCondLst>
+                                    <p:cond delay="0"/>
+                                  </p:stCondLst>
+                                  <p:childTnLst>
+                                    <p:animEffect transition="out" filter="fade">
+                                      <p:cBhvr>
+                                        <p:cTn id="16" dur="500"/>
+                                        <p:tgtEl>
+                                          <p:spTgt spid="5"/>
+                                        </p:tgtEl>
+                                      </p:cBhvr>
+                                    </p:animEffect>
+                                    <p:set>
+                                      <p:cBhvr>
+                                        <p:cTn id="17" dur="1" fill="hold">
+                                          <p:stCondLst>
+                                            <p:cond delay="499"/>
+                                          </p:stCondLst>
+                                        </p:cTn>
+                                        <p:tgtEl>
+                                          <p:spTgt spid="5"/>
+                                        </p:tgtEl>
+                                        <p:attrNameLst>
+                                          <p:attrName>style.visibility</p:attrName>
+                                        </p:attrNameLst>
+                                      </p:cBhvr>
+                                      <p:to>
+                                        <p:strVal val="hidden"/>
+                                      </p:to>
+                                    </p:set>
+                                  </p:childTnLst>
+                                </p:cTn>
+                              </p:par>
+                              <p:par>
+                                <p:cTn id="18" presetID="10" presetClass="exit" presetSubtype="0" fill="hold" nodeType="withEffect">
+                                  <p:stCondLst>
+                                    <p:cond delay="0"/>
+                                  </p:stCondLst>
+                                  <p:childTnLst>
+                                    <p:animEffect transition="out" filter="fade">
+                                      <p:cBhvr>
+                                        <p:cTn id="19" dur="500"/>
                                         <p:tgtEl>
                                           <p:spTgt spid="4"/>
                                         </p:tgtEl>
@@ -8365,7 +8564,7 @@
                                     </p:animEffect>
                                     <p:set>
                                       <p:cBhvr>
-                                        <p:cTn id="7" dur="1" fill="hold">
+                                        <p:cTn id="20" dur="1" fill="hold">
                                           <p:stCondLst>
                                             <p:cond delay="499"/>
                                           </p:stCondLst>
@@ -8388,20 +8587,20 @@
                           </p:cTn>
                         </p:par>
                         <p:par>
-                          <p:cTn id="8" fill="hold">
+                          <p:cTn id="21" fill="hold">
                             <p:stCondLst>
                               <p:cond delay="500"/>
                             </p:stCondLst>
                             <p:childTnLst>
                               <p:par>
-                                <p:cTn id="9" presetID="53" presetClass="entr" presetSubtype="16" fill="hold" nodeType="afterEffect">
+                                <p:cTn id="22" presetID="53" presetClass="entr" presetSubtype="16" fill="hold" nodeType="afterEffect">
                                   <p:stCondLst>
                                     <p:cond delay="0"/>
                                   </p:stCondLst>
                                   <p:childTnLst>
                                     <p:set>
                                       <p:cBhvr>
-                                        <p:cTn id="10" dur="1" fill="hold">
+                                        <p:cTn id="23" dur="1" fill="hold">
                                           <p:stCondLst>
                                             <p:cond delay="0"/>
                                           </p:stCondLst>
@@ -8419,7 +8618,7 @@
                                     </p:set>
                                     <p:anim calcmode="lin" valueType="num">
                                       <p:cBhvr>
-                                        <p:cTn id="11" dur="500" fill="hold"/>
+                                        <p:cTn id="24" dur="500" fill="hold"/>
                                         <p:tgtEl>
                                           <p:spTgt spid="3"/>
                                         </p:tgtEl>
@@ -8442,7 +8641,7 @@
                                     </p:anim>
                                     <p:anim calcmode="lin" valueType="num">
                                       <p:cBhvr>
-                                        <p:cTn id="12" dur="500" fill="hold"/>
+                                        <p:cTn id="25" dur="500" fill="hold"/>
                                         <p:tgtEl>
                                           <p:spTgt spid="3"/>
                                         </p:tgtEl>
@@ -8465,7 +8664,7 @@
                                     </p:anim>
                                     <p:animEffect transition="in" filter="fade">
                                       <p:cBhvr>
-                                        <p:cTn id="13" dur="500"/>
+                                        <p:cTn id="26" dur="500"/>
                                         <p:tgtEl>
                                           <p:spTgt spid="3"/>
                                         </p:tgtEl>

</xml_diff>